<commit_message>
added equations for basic attention
</commit_message>
<xml_diff>
--- a/Animations/Simple animations using powerpoint/Attention.pptx
+++ b/Animations/Simple animations using powerpoint/Attention.pptx
@@ -197,35 +197,35 @@
               <a:buNone/>
               <a:defRPr sz="2400"/>
             </a:lvl1pPr>
-            <a:lvl2pPr marL="457200" indent="0" algn="ctr">
+            <a:lvl2pPr marL="457189" indent="0" algn="ctr">
               <a:buNone/>
               <a:defRPr sz="2000"/>
             </a:lvl2pPr>
-            <a:lvl3pPr marL="914400" indent="0" algn="ctr">
+            <a:lvl3pPr marL="914377" indent="0" algn="ctr">
               <a:buNone/>
               <a:defRPr sz="1800"/>
             </a:lvl3pPr>
-            <a:lvl4pPr marL="1371600" indent="0" algn="ctr">
+            <a:lvl4pPr marL="1371566" indent="0" algn="ctr">
               <a:buNone/>
               <a:defRPr sz="1600"/>
             </a:lvl4pPr>
-            <a:lvl5pPr marL="1828800" indent="0" algn="ctr">
+            <a:lvl5pPr marL="1828754" indent="0" algn="ctr">
               <a:buNone/>
               <a:defRPr sz="1600"/>
             </a:lvl5pPr>
-            <a:lvl6pPr marL="2286000" indent="0" algn="ctr">
+            <a:lvl6pPr marL="2285943" indent="0" algn="ctr">
               <a:buNone/>
               <a:defRPr sz="1600"/>
             </a:lvl6pPr>
-            <a:lvl7pPr marL="2743200" indent="0" algn="ctr">
+            <a:lvl7pPr marL="2743131" indent="0" algn="ctr">
               <a:buNone/>
               <a:defRPr sz="1600"/>
             </a:lvl7pPr>
-            <a:lvl8pPr marL="3200400" indent="0" algn="ctr">
+            <a:lvl8pPr marL="3200320" indent="0" algn="ctr">
               <a:buNone/>
               <a:defRPr sz="1600"/>
             </a:lvl8pPr>
-            <a:lvl9pPr marL="3657600" indent="0" algn="ctr">
+            <a:lvl9pPr marL="3657509" indent="0" algn="ctr">
               <a:buNone/>
               <a:defRPr sz="1600"/>
             </a:lvl9pPr>
@@ -262,7 +262,7 @@
           <a:p>
             <a:fld id="{FB92FDD8-7731-4E46-9433-FCBAA3DC8EDF}" type="datetimeFigureOut">
               <a:rPr lang="en-GB" smtClean="0"/>
-              <a:t>17/08/2021</a:t>
+              <a:t>18/08/2021</a:t>
             </a:fld>
             <a:endParaRPr lang="en-GB"/>
           </a:p>
@@ -462,7 +462,7 @@
           <a:p>
             <a:fld id="{FB92FDD8-7731-4E46-9433-FCBAA3DC8EDF}" type="datetimeFigureOut">
               <a:rPr lang="en-GB" smtClean="0"/>
-              <a:t>17/08/2021</a:t>
+              <a:t>18/08/2021</a:t>
             </a:fld>
             <a:endParaRPr lang="en-GB"/>
           </a:p>
@@ -570,7 +570,7 @@
         </p:nvSpPr>
         <p:spPr>
           <a:xfrm>
-            <a:off x="8724900" y="365125"/>
+            <a:off x="8724901" y="365125"/>
             <a:ext cx="2628900" cy="5811838"/>
           </a:xfrm>
         </p:spPr>
@@ -604,7 +604,7 @@
         </p:nvSpPr>
         <p:spPr>
           <a:xfrm>
-            <a:off x="838200" y="365125"/>
+            <a:off x="838201" y="365125"/>
             <a:ext cx="7734300" cy="5811838"/>
           </a:xfrm>
         </p:spPr>
@@ -672,7 +672,7 @@
           <a:p>
             <a:fld id="{FB92FDD8-7731-4E46-9433-FCBAA3DC8EDF}" type="datetimeFigureOut">
               <a:rPr lang="en-GB" smtClean="0"/>
-              <a:t>17/08/2021</a:t>
+              <a:t>18/08/2021</a:t>
             </a:fld>
             <a:endParaRPr lang="en-GB"/>
           </a:p>
@@ -872,7 +872,7 @@
           <a:p>
             <a:fld id="{FB92FDD8-7731-4E46-9433-FCBAA3DC8EDF}" type="datetimeFigureOut">
               <a:rPr lang="en-GB" smtClean="0"/>
-              <a:t>17/08/2021</a:t>
+              <a:t>18/08/2021</a:t>
             </a:fld>
             <a:endParaRPr lang="en-GB"/>
           </a:p>
@@ -980,7 +980,7 @@
         </p:nvSpPr>
         <p:spPr>
           <a:xfrm>
-            <a:off x="831850" y="1709738"/>
+            <a:off x="831851" y="1709740"/>
             <a:ext cx="10515600" cy="2852737"/>
           </a:xfrm>
         </p:spPr>
@@ -1018,7 +1018,7 @@
         </p:nvSpPr>
         <p:spPr>
           <a:xfrm>
-            <a:off x="831850" y="4589463"/>
+            <a:off x="831851" y="4589465"/>
             <a:ext cx="10515600" cy="1500187"/>
           </a:xfrm>
         </p:spPr>
@@ -1035,7 +1035,7 @@
                 </a:solidFill>
               </a:defRPr>
             </a:lvl1pPr>
-            <a:lvl2pPr marL="457200" indent="0">
+            <a:lvl2pPr marL="457189" indent="0">
               <a:buNone/>
               <a:defRPr sz="2000">
                 <a:solidFill>
@@ -1045,7 +1045,7 @@
                 </a:solidFill>
               </a:defRPr>
             </a:lvl2pPr>
-            <a:lvl3pPr marL="914400" indent="0">
+            <a:lvl3pPr marL="914377" indent="0">
               <a:buNone/>
               <a:defRPr sz="1800">
                 <a:solidFill>
@@ -1055,7 +1055,7 @@
                 </a:solidFill>
               </a:defRPr>
             </a:lvl3pPr>
-            <a:lvl4pPr marL="1371600" indent="0">
+            <a:lvl4pPr marL="1371566" indent="0">
               <a:buNone/>
               <a:defRPr sz="1600">
                 <a:solidFill>
@@ -1065,7 +1065,7 @@
                 </a:solidFill>
               </a:defRPr>
             </a:lvl4pPr>
-            <a:lvl5pPr marL="1828800" indent="0">
+            <a:lvl5pPr marL="1828754" indent="0">
               <a:buNone/>
               <a:defRPr sz="1600">
                 <a:solidFill>
@@ -1075,7 +1075,7 @@
                 </a:solidFill>
               </a:defRPr>
             </a:lvl5pPr>
-            <a:lvl6pPr marL="2286000" indent="0">
+            <a:lvl6pPr marL="2285943" indent="0">
               <a:buNone/>
               <a:defRPr sz="1600">
                 <a:solidFill>
@@ -1085,7 +1085,7 @@
                 </a:solidFill>
               </a:defRPr>
             </a:lvl6pPr>
-            <a:lvl7pPr marL="2743200" indent="0">
+            <a:lvl7pPr marL="2743131" indent="0">
               <a:buNone/>
               <a:defRPr sz="1600">
                 <a:solidFill>
@@ -1095,7 +1095,7 @@
                 </a:solidFill>
               </a:defRPr>
             </a:lvl7pPr>
-            <a:lvl8pPr marL="3200400" indent="0">
+            <a:lvl8pPr marL="3200320" indent="0">
               <a:buNone/>
               <a:defRPr sz="1600">
                 <a:solidFill>
@@ -1105,7 +1105,7 @@
                 </a:solidFill>
               </a:defRPr>
             </a:lvl8pPr>
-            <a:lvl9pPr marL="3657600" indent="0">
+            <a:lvl9pPr marL="3657509" indent="0">
               <a:buNone/>
               <a:defRPr sz="1600">
                 <a:solidFill>
@@ -1148,7 +1148,7 @@
           <a:p>
             <a:fld id="{FB92FDD8-7731-4E46-9433-FCBAA3DC8EDF}" type="datetimeFigureOut">
               <a:rPr lang="en-GB" smtClean="0"/>
-              <a:t>17/08/2021</a:t>
+              <a:t>18/08/2021</a:t>
             </a:fld>
             <a:endParaRPr lang="en-GB"/>
           </a:p>
@@ -1416,7 +1416,7 @@
           <a:p>
             <a:fld id="{FB92FDD8-7731-4E46-9433-FCBAA3DC8EDF}" type="datetimeFigureOut">
               <a:rPr lang="en-GB" smtClean="0"/>
-              <a:t>17/08/2021</a:t>
+              <a:t>18/08/2021</a:t>
             </a:fld>
             <a:endParaRPr lang="en-GB"/>
           </a:p>
@@ -1524,7 +1524,7 @@
         </p:nvSpPr>
         <p:spPr>
           <a:xfrm>
-            <a:off x="839788" y="365125"/>
+            <a:off x="839788" y="365127"/>
             <a:ext cx="10515600" cy="1325563"/>
           </a:xfrm>
         </p:spPr>
@@ -1558,7 +1558,7 @@
         </p:nvSpPr>
         <p:spPr>
           <a:xfrm>
-            <a:off x="839788" y="1681163"/>
+            <a:off x="839789" y="1681163"/>
             <a:ext cx="5157787" cy="823912"/>
           </a:xfrm>
         </p:spPr>
@@ -1569,35 +1569,35 @@
               <a:buNone/>
               <a:defRPr sz="2400" b="1"/>
             </a:lvl1pPr>
-            <a:lvl2pPr marL="457200" indent="0">
+            <a:lvl2pPr marL="457189" indent="0">
               <a:buNone/>
               <a:defRPr sz="2000" b="1"/>
             </a:lvl2pPr>
-            <a:lvl3pPr marL="914400" indent="0">
+            <a:lvl3pPr marL="914377" indent="0">
               <a:buNone/>
               <a:defRPr sz="1800" b="1"/>
             </a:lvl3pPr>
-            <a:lvl4pPr marL="1371600" indent="0">
+            <a:lvl4pPr marL="1371566" indent="0">
               <a:buNone/>
               <a:defRPr sz="1600" b="1"/>
             </a:lvl4pPr>
-            <a:lvl5pPr marL="1828800" indent="0">
+            <a:lvl5pPr marL="1828754" indent="0">
               <a:buNone/>
               <a:defRPr sz="1600" b="1"/>
             </a:lvl5pPr>
-            <a:lvl6pPr marL="2286000" indent="0">
+            <a:lvl6pPr marL="2285943" indent="0">
               <a:buNone/>
               <a:defRPr sz="1600" b="1"/>
             </a:lvl6pPr>
-            <a:lvl7pPr marL="2743200" indent="0">
+            <a:lvl7pPr marL="2743131" indent="0">
               <a:buNone/>
               <a:defRPr sz="1600" b="1"/>
             </a:lvl7pPr>
-            <a:lvl8pPr marL="3200400" indent="0">
+            <a:lvl8pPr marL="3200320" indent="0">
               <a:buNone/>
               <a:defRPr sz="1600" b="1"/>
             </a:lvl8pPr>
-            <a:lvl9pPr marL="3657600" indent="0">
+            <a:lvl9pPr marL="3657509" indent="0">
               <a:buNone/>
               <a:defRPr sz="1600" b="1"/>
             </a:lvl9pPr>
@@ -1629,7 +1629,7 @@
         </p:nvSpPr>
         <p:spPr>
           <a:xfrm>
-            <a:off x="839788" y="2505075"/>
+            <a:off x="839789" y="2505075"/>
             <a:ext cx="5157787" cy="3684588"/>
           </a:xfrm>
         </p:spPr>
@@ -1692,7 +1692,7 @@
         </p:nvSpPr>
         <p:spPr>
           <a:xfrm>
-            <a:off x="6172200" y="1681163"/>
+            <a:off x="6172201" y="1681163"/>
             <a:ext cx="5183188" cy="823912"/>
           </a:xfrm>
         </p:spPr>
@@ -1703,35 +1703,35 @@
               <a:buNone/>
               <a:defRPr sz="2400" b="1"/>
             </a:lvl1pPr>
-            <a:lvl2pPr marL="457200" indent="0">
+            <a:lvl2pPr marL="457189" indent="0">
               <a:buNone/>
               <a:defRPr sz="2000" b="1"/>
             </a:lvl2pPr>
-            <a:lvl3pPr marL="914400" indent="0">
+            <a:lvl3pPr marL="914377" indent="0">
               <a:buNone/>
               <a:defRPr sz="1800" b="1"/>
             </a:lvl3pPr>
-            <a:lvl4pPr marL="1371600" indent="0">
+            <a:lvl4pPr marL="1371566" indent="0">
               <a:buNone/>
               <a:defRPr sz="1600" b="1"/>
             </a:lvl4pPr>
-            <a:lvl5pPr marL="1828800" indent="0">
+            <a:lvl5pPr marL="1828754" indent="0">
               <a:buNone/>
               <a:defRPr sz="1600" b="1"/>
             </a:lvl5pPr>
-            <a:lvl6pPr marL="2286000" indent="0">
+            <a:lvl6pPr marL="2285943" indent="0">
               <a:buNone/>
               <a:defRPr sz="1600" b="1"/>
             </a:lvl6pPr>
-            <a:lvl7pPr marL="2743200" indent="0">
+            <a:lvl7pPr marL="2743131" indent="0">
               <a:buNone/>
               <a:defRPr sz="1600" b="1"/>
             </a:lvl7pPr>
-            <a:lvl8pPr marL="3200400" indent="0">
+            <a:lvl8pPr marL="3200320" indent="0">
               <a:buNone/>
               <a:defRPr sz="1600" b="1"/>
             </a:lvl8pPr>
-            <a:lvl9pPr marL="3657600" indent="0">
+            <a:lvl9pPr marL="3657509" indent="0">
               <a:buNone/>
               <a:defRPr sz="1600" b="1"/>
             </a:lvl9pPr>
@@ -1763,7 +1763,7 @@
         </p:nvSpPr>
         <p:spPr>
           <a:xfrm>
-            <a:off x="6172200" y="2505075"/>
+            <a:off x="6172201" y="2505075"/>
             <a:ext cx="5183188" cy="3684588"/>
           </a:xfrm>
         </p:spPr>
@@ -1831,7 +1831,7 @@
           <a:p>
             <a:fld id="{FB92FDD8-7731-4E46-9433-FCBAA3DC8EDF}" type="datetimeFigureOut">
               <a:rPr lang="en-GB" smtClean="0"/>
-              <a:t>17/08/2021</a:t>
+              <a:t>18/08/2021</a:t>
             </a:fld>
             <a:endParaRPr lang="en-GB"/>
           </a:p>
@@ -1973,7 +1973,7 @@
           <a:p>
             <a:fld id="{FB92FDD8-7731-4E46-9433-FCBAA3DC8EDF}" type="datetimeFigureOut">
               <a:rPr lang="en-GB" smtClean="0"/>
-              <a:t>17/08/2021</a:t>
+              <a:t>18/08/2021</a:t>
             </a:fld>
             <a:endParaRPr lang="en-GB"/>
           </a:p>
@@ -2086,7 +2086,7 @@
           <a:p>
             <a:fld id="{FB92FDD8-7731-4E46-9433-FCBAA3DC8EDF}" type="datetimeFigureOut">
               <a:rPr lang="en-GB" smtClean="0"/>
-              <a:t>17/08/2021</a:t>
+              <a:t>18/08/2021</a:t>
             </a:fld>
             <a:endParaRPr lang="en-GB"/>
           </a:p>
@@ -2232,7 +2232,7 @@
         </p:nvSpPr>
         <p:spPr>
           <a:xfrm>
-            <a:off x="5183188" y="987425"/>
+            <a:off x="5183188" y="987427"/>
             <a:ext cx="6172200" cy="4873625"/>
           </a:xfrm>
         </p:spPr>
@@ -2334,35 +2334,35 @@
               <a:buNone/>
               <a:defRPr sz="1600"/>
             </a:lvl1pPr>
-            <a:lvl2pPr marL="457200" indent="0">
+            <a:lvl2pPr marL="457189" indent="0">
               <a:buNone/>
               <a:defRPr sz="1400"/>
             </a:lvl2pPr>
-            <a:lvl3pPr marL="914400" indent="0">
+            <a:lvl3pPr marL="914377" indent="0">
               <a:buNone/>
               <a:defRPr sz="1200"/>
             </a:lvl3pPr>
-            <a:lvl4pPr marL="1371600" indent="0">
+            <a:lvl4pPr marL="1371566" indent="0">
               <a:buNone/>
               <a:defRPr sz="1000"/>
             </a:lvl4pPr>
-            <a:lvl5pPr marL="1828800" indent="0">
+            <a:lvl5pPr marL="1828754" indent="0">
               <a:buNone/>
               <a:defRPr sz="1000"/>
             </a:lvl5pPr>
-            <a:lvl6pPr marL="2286000" indent="0">
+            <a:lvl6pPr marL="2285943" indent="0">
               <a:buNone/>
               <a:defRPr sz="1000"/>
             </a:lvl6pPr>
-            <a:lvl7pPr marL="2743200" indent="0">
+            <a:lvl7pPr marL="2743131" indent="0">
               <a:buNone/>
               <a:defRPr sz="1000"/>
             </a:lvl7pPr>
-            <a:lvl8pPr marL="3200400" indent="0">
+            <a:lvl8pPr marL="3200320" indent="0">
               <a:buNone/>
               <a:defRPr sz="1000"/>
             </a:lvl8pPr>
-            <a:lvl9pPr marL="3657600" indent="0">
+            <a:lvl9pPr marL="3657509" indent="0">
               <a:buNone/>
               <a:defRPr sz="1000"/>
             </a:lvl9pPr>
@@ -2399,7 +2399,7 @@
           <a:p>
             <a:fld id="{FB92FDD8-7731-4E46-9433-FCBAA3DC8EDF}" type="datetimeFigureOut">
               <a:rPr lang="en-GB" smtClean="0"/>
-              <a:t>17/08/2021</a:t>
+              <a:t>18/08/2021</a:t>
             </a:fld>
             <a:endParaRPr lang="en-GB"/>
           </a:p>
@@ -2545,7 +2545,7 @@
         </p:nvSpPr>
         <p:spPr>
           <a:xfrm>
-            <a:off x="5183188" y="987425"/>
+            <a:off x="5183188" y="987427"/>
             <a:ext cx="6172200" cy="4873625"/>
           </a:xfrm>
         </p:spPr>
@@ -2556,35 +2556,35 @@
               <a:buNone/>
               <a:defRPr sz="3200"/>
             </a:lvl1pPr>
-            <a:lvl2pPr marL="457200" indent="0">
+            <a:lvl2pPr marL="457189" indent="0">
               <a:buNone/>
               <a:defRPr sz="2800"/>
             </a:lvl2pPr>
-            <a:lvl3pPr marL="914400" indent="0">
+            <a:lvl3pPr marL="914377" indent="0">
               <a:buNone/>
               <a:defRPr sz="2400"/>
             </a:lvl3pPr>
-            <a:lvl4pPr marL="1371600" indent="0">
+            <a:lvl4pPr marL="1371566" indent="0">
               <a:buNone/>
               <a:defRPr sz="2000"/>
             </a:lvl4pPr>
-            <a:lvl5pPr marL="1828800" indent="0">
+            <a:lvl5pPr marL="1828754" indent="0">
               <a:buNone/>
               <a:defRPr sz="2000"/>
             </a:lvl5pPr>
-            <a:lvl6pPr marL="2286000" indent="0">
+            <a:lvl6pPr marL="2285943" indent="0">
               <a:buNone/>
               <a:defRPr sz="2000"/>
             </a:lvl6pPr>
-            <a:lvl7pPr marL="2743200" indent="0">
+            <a:lvl7pPr marL="2743131" indent="0">
               <a:buNone/>
               <a:defRPr sz="2000"/>
             </a:lvl7pPr>
-            <a:lvl8pPr marL="3200400" indent="0">
+            <a:lvl8pPr marL="3200320" indent="0">
               <a:buNone/>
               <a:defRPr sz="2000"/>
             </a:lvl8pPr>
-            <a:lvl9pPr marL="3657600" indent="0">
+            <a:lvl9pPr marL="3657509" indent="0">
               <a:buNone/>
               <a:defRPr sz="2000"/>
             </a:lvl9pPr>
@@ -2623,35 +2623,35 @@
               <a:buNone/>
               <a:defRPr sz="1600"/>
             </a:lvl1pPr>
-            <a:lvl2pPr marL="457200" indent="0">
+            <a:lvl2pPr marL="457189" indent="0">
               <a:buNone/>
               <a:defRPr sz="1400"/>
             </a:lvl2pPr>
-            <a:lvl3pPr marL="914400" indent="0">
+            <a:lvl3pPr marL="914377" indent="0">
               <a:buNone/>
               <a:defRPr sz="1200"/>
             </a:lvl3pPr>
-            <a:lvl4pPr marL="1371600" indent="0">
+            <a:lvl4pPr marL="1371566" indent="0">
               <a:buNone/>
               <a:defRPr sz="1000"/>
             </a:lvl4pPr>
-            <a:lvl5pPr marL="1828800" indent="0">
+            <a:lvl5pPr marL="1828754" indent="0">
               <a:buNone/>
               <a:defRPr sz="1000"/>
             </a:lvl5pPr>
-            <a:lvl6pPr marL="2286000" indent="0">
+            <a:lvl6pPr marL="2285943" indent="0">
               <a:buNone/>
               <a:defRPr sz="1000"/>
             </a:lvl6pPr>
-            <a:lvl7pPr marL="2743200" indent="0">
+            <a:lvl7pPr marL="2743131" indent="0">
               <a:buNone/>
               <a:defRPr sz="1000"/>
             </a:lvl7pPr>
-            <a:lvl8pPr marL="3200400" indent="0">
+            <a:lvl8pPr marL="3200320" indent="0">
               <a:buNone/>
               <a:defRPr sz="1000"/>
             </a:lvl8pPr>
-            <a:lvl9pPr marL="3657600" indent="0">
+            <a:lvl9pPr marL="3657509" indent="0">
               <a:buNone/>
               <a:defRPr sz="1000"/>
             </a:lvl9pPr>
@@ -2688,7 +2688,7 @@
           <a:p>
             <a:fld id="{FB92FDD8-7731-4E46-9433-FCBAA3DC8EDF}" type="datetimeFigureOut">
               <a:rPr lang="en-GB" smtClean="0"/>
-              <a:t>17/08/2021</a:t>
+              <a:t>18/08/2021</a:t>
             </a:fld>
             <a:endParaRPr lang="en-GB"/>
           </a:p>
@@ -2801,7 +2801,7 @@
         </p:nvSpPr>
         <p:spPr>
           <a:xfrm>
-            <a:off x="838200" y="365125"/>
+            <a:off x="838200" y="365127"/>
             <a:ext cx="10515600" cy="1325563"/>
           </a:xfrm>
           <a:prstGeom prst="rect">
@@ -2908,7 +2908,7 @@
         </p:nvSpPr>
         <p:spPr>
           <a:xfrm>
-            <a:off x="838200" y="6356350"/>
+            <a:off x="838200" y="6356352"/>
             <a:ext cx="2743200" cy="365125"/>
           </a:xfrm>
           <a:prstGeom prst="rect">
@@ -2931,7 +2931,7 @@
           <a:p>
             <a:fld id="{FB92FDD8-7731-4E46-9433-FCBAA3DC8EDF}" type="datetimeFigureOut">
               <a:rPr lang="en-GB" smtClean="0"/>
-              <a:t>17/08/2021</a:t>
+              <a:t>18/08/2021</a:t>
             </a:fld>
             <a:endParaRPr lang="en-GB"/>
           </a:p>
@@ -2955,7 +2955,7 @@
         </p:nvSpPr>
         <p:spPr>
           <a:xfrm>
-            <a:off x="4038600" y="6356350"/>
+            <a:off x="4038600" y="6356352"/>
             <a:ext cx="4114800" cy="365125"/>
           </a:xfrm>
           <a:prstGeom prst="rect">
@@ -2998,7 +2998,7 @@
         </p:nvSpPr>
         <p:spPr>
           <a:xfrm>
-            <a:off x="8610600" y="6356350"/>
+            <a:off x="8610600" y="6356352"/>
             <a:ext cx="2743200" cy="365125"/>
           </a:xfrm>
           <a:prstGeom prst="rect">
@@ -3050,7 +3050,7 @@
   </p:sldLayoutIdLst>
   <p:txStyles>
     <p:titleStyle>
-      <a:lvl1pPr algn="l" defTabSz="914400" rtl="0" eaLnBrk="1" latinLnBrk="0" hangingPunct="1">
+      <a:lvl1pPr algn="l" defTabSz="914377" rtl="0" eaLnBrk="1" latinLnBrk="0" hangingPunct="1">
         <a:lnSpc>
           <a:spcPct val="90000"/>
         </a:lnSpc>
@@ -3069,7 +3069,7 @@
       </a:lvl1pPr>
     </p:titleStyle>
     <p:bodyStyle>
-      <a:lvl1pPr marL="228600" indent="-228600" algn="l" defTabSz="914400" rtl="0" eaLnBrk="1" latinLnBrk="0" hangingPunct="1">
+      <a:lvl1pPr marL="228594" indent="-228594" algn="l" defTabSz="914377" rtl="0" eaLnBrk="1" latinLnBrk="0" hangingPunct="1">
         <a:lnSpc>
           <a:spcPct val="90000"/>
         </a:lnSpc>
@@ -3087,7 +3087,7 @@
           <a:cs typeface="+mn-cs"/>
         </a:defRPr>
       </a:lvl1pPr>
-      <a:lvl2pPr marL="685800" indent="-228600" algn="l" defTabSz="914400" rtl="0" eaLnBrk="1" latinLnBrk="0" hangingPunct="1">
+      <a:lvl2pPr marL="685783" indent="-228594" algn="l" defTabSz="914377" rtl="0" eaLnBrk="1" latinLnBrk="0" hangingPunct="1">
         <a:lnSpc>
           <a:spcPct val="90000"/>
         </a:lnSpc>
@@ -3105,7 +3105,7 @@
           <a:cs typeface="+mn-cs"/>
         </a:defRPr>
       </a:lvl2pPr>
-      <a:lvl3pPr marL="1143000" indent="-228600" algn="l" defTabSz="914400" rtl="0" eaLnBrk="1" latinLnBrk="0" hangingPunct="1">
+      <a:lvl3pPr marL="1142971" indent="-228594" algn="l" defTabSz="914377" rtl="0" eaLnBrk="1" latinLnBrk="0" hangingPunct="1">
         <a:lnSpc>
           <a:spcPct val="90000"/>
         </a:lnSpc>
@@ -3123,7 +3123,7 @@
           <a:cs typeface="+mn-cs"/>
         </a:defRPr>
       </a:lvl3pPr>
-      <a:lvl4pPr marL="1600200" indent="-228600" algn="l" defTabSz="914400" rtl="0" eaLnBrk="1" latinLnBrk="0" hangingPunct="1">
+      <a:lvl4pPr marL="1600160" indent="-228594" algn="l" defTabSz="914377" rtl="0" eaLnBrk="1" latinLnBrk="0" hangingPunct="1">
         <a:lnSpc>
           <a:spcPct val="90000"/>
         </a:lnSpc>
@@ -3141,7 +3141,7 @@
           <a:cs typeface="+mn-cs"/>
         </a:defRPr>
       </a:lvl4pPr>
-      <a:lvl5pPr marL="2057400" indent="-228600" algn="l" defTabSz="914400" rtl="0" eaLnBrk="1" latinLnBrk="0" hangingPunct="1">
+      <a:lvl5pPr marL="2057349" indent="-228594" algn="l" defTabSz="914377" rtl="0" eaLnBrk="1" latinLnBrk="0" hangingPunct="1">
         <a:lnSpc>
           <a:spcPct val="90000"/>
         </a:lnSpc>
@@ -3159,7 +3159,7 @@
           <a:cs typeface="+mn-cs"/>
         </a:defRPr>
       </a:lvl5pPr>
-      <a:lvl6pPr marL="2514600" indent="-228600" algn="l" defTabSz="914400" rtl="0" eaLnBrk="1" latinLnBrk="0" hangingPunct="1">
+      <a:lvl6pPr marL="2514537" indent="-228594" algn="l" defTabSz="914377" rtl="0" eaLnBrk="1" latinLnBrk="0" hangingPunct="1">
         <a:lnSpc>
           <a:spcPct val="90000"/>
         </a:lnSpc>
@@ -3177,7 +3177,7 @@
           <a:cs typeface="+mn-cs"/>
         </a:defRPr>
       </a:lvl6pPr>
-      <a:lvl7pPr marL="2971800" indent="-228600" algn="l" defTabSz="914400" rtl="0" eaLnBrk="1" latinLnBrk="0" hangingPunct="1">
+      <a:lvl7pPr marL="2971726" indent="-228594" algn="l" defTabSz="914377" rtl="0" eaLnBrk="1" latinLnBrk="0" hangingPunct="1">
         <a:lnSpc>
           <a:spcPct val="90000"/>
         </a:lnSpc>
@@ -3195,7 +3195,7 @@
           <a:cs typeface="+mn-cs"/>
         </a:defRPr>
       </a:lvl7pPr>
-      <a:lvl8pPr marL="3429000" indent="-228600" algn="l" defTabSz="914400" rtl="0" eaLnBrk="1" latinLnBrk="0" hangingPunct="1">
+      <a:lvl8pPr marL="3428914" indent="-228594" algn="l" defTabSz="914377" rtl="0" eaLnBrk="1" latinLnBrk="0" hangingPunct="1">
         <a:lnSpc>
           <a:spcPct val="90000"/>
         </a:lnSpc>
@@ -3213,7 +3213,7 @@
           <a:cs typeface="+mn-cs"/>
         </a:defRPr>
       </a:lvl8pPr>
-      <a:lvl9pPr marL="3886200" indent="-228600" algn="l" defTabSz="914400" rtl="0" eaLnBrk="1" latinLnBrk="0" hangingPunct="1">
+      <a:lvl9pPr marL="3886103" indent="-228594" algn="l" defTabSz="914377" rtl="0" eaLnBrk="1" latinLnBrk="0" hangingPunct="1">
         <a:lnSpc>
           <a:spcPct val="90000"/>
         </a:lnSpc>
@@ -3236,7 +3236,7 @@
       <a:defPPr>
         <a:defRPr lang="en-US"/>
       </a:defPPr>
-      <a:lvl1pPr marL="0" algn="l" defTabSz="914400" rtl="0" eaLnBrk="1" latinLnBrk="0" hangingPunct="1">
+      <a:lvl1pPr marL="0" algn="l" defTabSz="914377" rtl="0" eaLnBrk="1" latinLnBrk="0" hangingPunct="1">
         <a:defRPr sz="1800" kern="1200">
           <a:solidFill>
             <a:schemeClr val="tx1"/>
@@ -3246,7 +3246,7 @@
           <a:cs typeface="+mn-cs"/>
         </a:defRPr>
       </a:lvl1pPr>
-      <a:lvl2pPr marL="457200" algn="l" defTabSz="914400" rtl="0" eaLnBrk="1" latinLnBrk="0" hangingPunct="1">
+      <a:lvl2pPr marL="457189" algn="l" defTabSz="914377" rtl="0" eaLnBrk="1" latinLnBrk="0" hangingPunct="1">
         <a:defRPr sz="1800" kern="1200">
           <a:solidFill>
             <a:schemeClr val="tx1"/>
@@ -3256,7 +3256,7 @@
           <a:cs typeface="+mn-cs"/>
         </a:defRPr>
       </a:lvl2pPr>
-      <a:lvl3pPr marL="914400" algn="l" defTabSz="914400" rtl="0" eaLnBrk="1" latinLnBrk="0" hangingPunct="1">
+      <a:lvl3pPr marL="914377" algn="l" defTabSz="914377" rtl="0" eaLnBrk="1" latinLnBrk="0" hangingPunct="1">
         <a:defRPr sz="1800" kern="1200">
           <a:solidFill>
             <a:schemeClr val="tx1"/>
@@ -3266,7 +3266,7 @@
           <a:cs typeface="+mn-cs"/>
         </a:defRPr>
       </a:lvl3pPr>
-      <a:lvl4pPr marL="1371600" algn="l" defTabSz="914400" rtl="0" eaLnBrk="1" latinLnBrk="0" hangingPunct="1">
+      <a:lvl4pPr marL="1371566" algn="l" defTabSz="914377" rtl="0" eaLnBrk="1" latinLnBrk="0" hangingPunct="1">
         <a:defRPr sz="1800" kern="1200">
           <a:solidFill>
             <a:schemeClr val="tx1"/>
@@ -3276,7 +3276,7 @@
           <a:cs typeface="+mn-cs"/>
         </a:defRPr>
       </a:lvl4pPr>
-      <a:lvl5pPr marL="1828800" algn="l" defTabSz="914400" rtl="0" eaLnBrk="1" latinLnBrk="0" hangingPunct="1">
+      <a:lvl5pPr marL="1828754" algn="l" defTabSz="914377" rtl="0" eaLnBrk="1" latinLnBrk="0" hangingPunct="1">
         <a:defRPr sz="1800" kern="1200">
           <a:solidFill>
             <a:schemeClr val="tx1"/>
@@ -3286,7 +3286,7 @@
           <a:cs typeface="+mn-cs"/>
         </a:defRPr>
       </a:lvl5pPr>
-      <a:lvl6pPr marL="2286000" algn="l" defTabSz="914400" rtl="0" eaLnBrk="1" latinLnBrk="0" hangingPunct="1">
+      <a:lvl6pPr marL="2285943" algn="l" defTabSz="914377" rtl="0" eaLnBrk="1" latinLnBrk="0" hangingPunct="1">
         <a:defRPr sz="1800" kern="1200">
           <a:solidFill>
             <a:schemeClr val="tx1"/>
@@ -3296,7 +3296,7 @@
           <a:cs typeface="+mn-cs"/>
         </a:defRPr>
       </a:lvl6pPr>
-      <a:lvl7pPr marL="2743200" algn="l" defTabSz="914400" rtl="0" eaLnBrk="1" latinLnBrk="0" hangingPunct="1">
+      <a:lvl7pPr marL="2743131" algn="l" defTabSz="914377" rtl="0" eaLnBrk="1" latinLnBrk="0" hangingPunct="1">
         <a:defRPr sz="1800" kern="1200">
           <a:solidFill>
             <a:schemeClr val="tx1"/>
@@ -3306,7 +3306,7 @@
           <a:cs typeface="+mn-cs"/>
         </a:defRPr>
       </a:lvl7pPr>
-      <a:lvl8pPr marL="3200400" algn="l" defTabSz="914400" rtl="0" eaLnBrk="1" latinLnBrk="0" hangingPunct="1">
+      <a:lvl8pPr marL="3200320" algn="l" defTabSz="914377" rtl="0" eaLnBrk="1" latinLnBrk="0" hangingPunct="1">
         <a:defRPr sz="1800" kern="1200">
           <a:solidFill>
             <a:schemeClr val="tx1"/>
@@ -3316,7 +3316,7 @@
           <a:cs typeface="+mn-cs"/>
         </a:defRPr>
       </a:lvl8pPr>
-      <a:lvl9pPr marL="3657600" algn="l" defTabSz="914400" rtl="0" eaLnBrk="1" latinLnBrk="0" hangingPunct="1">
+      <a:lvl9pPr marL="3657509" algn="l" defTabSz="914377" rtl="0" eaLnBrk="1" latinLnBrk="0" hangingPunct="1">
         <a:defRPr sz="1800" kern="1200">
           <a:solidFill>
             <a:schemeClr val="tx1"/>
@@ -3362,8 +3362,8 @@
         </p:nvSpPr>
         <p:spPr>
           <a:xfrm>
-            <a:off x="6972475" y="2148897"/>
-            <a:ext cx="2688772" cy="2525814"/>
+            <a:off x="6972475" y="2148898"/>
+            <a:ext cx="2688772" cy="2525815"/>
           </a:xfrm>
           <a:prstGeom prst="rect">
             <a:avLst/>
@@ -3429,7 +3429,7 @@
         </p:nvGrpSpPr>
         <p:grpSpPr>
           <a:xfrm>
-            <a:off x="1743075" y="1526503"/>
+            <a:off x="1743076" y="1526502"/>
             <a:ext cx="1561011" cy="261610"/>
             <a:chOff x="609600" y="1421728"/>
             <a:chExt cx="1561011" cy="261610"/>
@@ -3698,8 +3698,8 @@
           </p:nvSpPr>
           <p:spPr>
             <a:xfrm>
-              <a:off x="1368334" y="1421728"/>
-              <a:ext cx="802277" cy="261610"/>
+              <a:off x="1368333" y="1421728"/>
+              <a:ext cx="802278" cy="261610"/>
             </a:xfrm>
             <a:prstGeom prst="rect">
               <a:avLst/>
@@ -3735,7 +3735,7 @@
         </p:nvGrpSpPr>
         <p:grpSpPr>
           <a:xfrm>
-            <a:off x="1743075" y="1345565"/>
+            <a:off x="1743076" y="1345567"/>
             <a:ext cx="1561011" cy="261610"/>
             <a:chOff x="609600" y="1240790"/>
             <a:chExt cx="1561011" cy="261610"/>
@@ -4004,8 +4004,8 @@
           </p:nvSpPr>
           <p:spPr>
             <a:xfrm>
-              <a:off x="1368334" y="1240790"/>
-              <a:ext cx="802277" cy="261610"/>
+              <a:off x="1368333" y="1240790"/>
+              <a:ext cx="802278" cy="261610"/>
             </a:xfrm>
             <a:prstGeom prst="rect">
               <a:avLst/>
@@ -4041,8 +4041,8 @@
         </p:nvGrpSpPr>
         <p:grpSpPr>
           <a:xfrm>
-            <a:off x="1743075" y="1172178"/>
-            <a:ext cx="1561010" cy="261610"/>
+            <a:off x="1743075" y="1172182"/>
+            <a:ext cx="1561011" cy="261610"/>
             <a:chOff x="609600" y="1069784"/>
             <a:chExt cx="1561010" cy="261610"/>
           </a:xfrm>
@@ -4348,7 +4348,7 @@
         <p:grpSpPr>
           <a:xfrm>
             <a:off x="1743075" y="972400"/>
-            <a:ext cx="1561010" cy="261610"/>
+            <a:ext cx="1561011" cy="261610"/>
             <a:chOff x="609600" y="867625"/>
             <a:chExt cx="1561010" cy="261610"/>
           </a:xfrm>
@@ -4653,7 +4653,7 @@
         </p:nvGrpSpPr>
         <p:grpSpPr>
           <a:xfrm>
-            <a:off x="1743075" y="781788"/>
+            <a:off x="1743076" y="781787"/>
             <a:ext cx="1550125" cy="261610"/>
             <a:chOff x="609600" y="677013"/>
             <a:chExt cx="1550125" cy="261610"/>
@@ -4960,9 +4960,9 @@
         <p:grpSpPr>
           <a:xfrm>
             <a:off x="1743075" y="598506"/>
-            <a:ext cx="1561010" cy="261610"/>
+            <a:ext cx="1561011" cy="261610"/>
             <a:chOff x="609600" y="493731"/>
-            <a:chExt cx="1561010" cy="261610"/>
+            <a:chExt cx="1561010" cy="261609"/>
           </a:xfrm>
         </p:grpSpPr>
         <p:grpSp>
@@ -5229,7 +5229,7 @@
           <p:spPr>
             <a:xfrm>
               <a:off x="1368333" y="493731"/>
-              <a:ext cx="802277" cy="261610"/>
+              <a:ext cx="802277" cy="261609"/>
             </a:xfrm>
             <a:prstGeom prst="rect">
               <a:avLst/>
@@ -5265,10 +5265,10 @@
         </p:nvGrpSpPr>
         <p:grpSpPr>
           <a:xfrm>
-            <a:off x="1743075" y="414841"/>
-            <a:ext cx="1561010" cy="261610"/>
+            <a:off x="1743075" y="414842"/>
+            <a:ext cx="1561011" cy="261610"/>
             <a:chOff x="609600" y="310066"/>
-            <a:chExt cx="1561010" cy="261610"/>
+            <a:chExt cx="1561010" cy="261609"/>
           </a:xfrm>
         </p:grpSpPr>
         <p:grpSp>
@@ -5535,7 +5535,7 @@
           <p:spPr>
             <a:xfrm>
               <a:off x="1368333" y="310066"/>
-              <a:ext cx="802277" cy="261610"/>
+              <a:ext cx="802277" cy="261609"/>
             </a:xfrm>
             <a:prstGeom prst="rect">
               <a:avLst/>
@@ -5877,8 +5877,8 @@
         </p:nvGrpSpPr>
         <p:grpSpPr>
           <a:xfrm>
-            <a:off x="4938575" y="2881738"/>
-            <a:ext cx="1353640" cy="520541"/>
+            <a:off x="4938575" y="2881741"/>
+            <a:ext cx="1353640" cy="520542"/>
             <a:chOff x="3138350" y="2225040"/>
             <a:chExt cx="1353640" cy="520541"/>
           </a:xfrm>
@@ -6151,8 +6151,8 @@
         </p:nvGrpSpPr>
         <p:grpSpPr>
           <a:xfrm>
-            <a:off x="7575095" y="1233414"/>
-            <a:ext cx="1287780" cy="520541"/>
+            <a:off x="7575095" y="1233418"/>
+            <a:ext cx="1287780" cy="520542"/>
             <a:chOff x="3138350" y="2225040"/>
             <a:chExt cx="1287780" cy="520541"/>
           </a:xfrm>
@@ -6425,8 +6425,8 @@
         </p:nvGrpSpPr>
         <p:grpSpPr>
           <a:xfrm>
-            <a:off x="7575095" y="1233414"/>
-            <a:ext cx="1287780" cy="520541"/>
+            <a:off x="7575095" y="1233418"/>
+            <a:ext cx="1287780" cy="520542"/>
             <a:chOff x="3138350" y="2225040"/>
             <a:chExt cx="1287780" cy="520541"/>
           </a:xfrm>
@@ -6698,8 +6698,8 @@
         </p:nvGrpSpPr>
         <p:grpSpPr>
           <a:xfrm>
-            <a:off x="7575095" y="1233414"/>
-            <a:ext cx="1287780" cy="520541"/>
+            <a:off x="7575095" y="1233418"/>
+            <a:ext cx="1287780" cy="520542"/>
             <a:chOff x="3138350" y="2225040"/>
             <a:chExt cx="1287780" cy="520541"/>
           </a:xfrm>
@@ -6971,8 +6971,8 @@
         </p:nvGrpSpPr>
         <p:grpSpPr>
           <a:xfrm>
-            <a:off x="7575095" y="1233414"/>
-            <a:ext cx="1287780" cy="520541"/>
+            <a:off x="7575095" y="1233418"/>
+            <a:ext cx="1287780" cy="520542"/>
             <a:chOff x="3138350" y="2225040"/>
             <a:chExt cx="1287780" cy="520541"/>
           </a:xfrm>
@@ -7244,8 +7244,8 @@
         </p:nvGrpSpPr>
         <p:grpSpPr>
           <a:xfrm>
-            <a:off x="7575095" y="1233414"/>
-            <a:ext cx="1287780" cy="520541"/>
+            <a:off x="7575095" y="1233418"/>
+            <a:ext cx="1287780" cy="520542"/>
             <a:chOff x="3138350" y="2225040"/>
             <a:chExt cx="1287780" cy="520541"/>
           </a:xfrm>
@@ -7517,8 +7517,8 @@
         </p:nvGrpSpPr>
         <p:grpSpPr>
           <a:xfrm>
-            <a:off x="7575094" y="1233414"/>
-            <a:ext cx="1287780" cy="520541"/>
+            <a:off x="7575095" y="1233418"/>
+            <a:ext cx="1287780" cy="520542"/>
             <a:chOff x="3138350" y="2225040"/>
             <a:chExt cx="1287780" cy="520541"/>
           </a:xfrm>
@@ -7790,8 +7790,8 @@
         </p:nvGrpSpPr>
         <p:grpSpPr>
           <a:xfrm>
-            <a:off x="7575094" y="1233414"/>
-            <a:ext cx="1287780" cy="520541"/>
+            <a:off x="7575095" y="1233418"/>
+            <a:ext cx="1287780" cy="520542"/>
             <a:chOff x="3138350" y="2225040"/>
             <a:chExt cx="1287780" cy="520541"/>
           </a:xfrm>
@@ -8063,8 +8063,8 @@
         </p:nvGrpSpPr>
         <p:grpSpPr>
           <a:xfrm>
-            <a:off x="7575093" y="1233414"/>
-            <a:ext cx="1381228" cy="520541"/>
+            <a:off x="7575094" y="1233418"/>
+            <a:ext cx="1381228" cy="520542"/>
             <a:chOff x="3138350" y="2225040"/>
             <a:chExt cx="1381228" cy="520541"/>
           </a:xfrm>
@@ -8471,7 +8471,7 @@
         <p:spPr>
           <a:xfrm>
             <a:off x="7229475" y="4963207"/>
-            <a:ext cx="3257550" cy="523220"/>
+            <a:ext cx="3257551" cy="523220"/>
           </a:xfrm>
           <a:prstGeom prst="rect">
             <a:avLst/>
@@ -8531,7 +8531,7 @@
         <p:spPr>
           <a:xfrm>
             <a:off x="7229475" y="4964367"/>
-            <a:ext cx="3257550" cy="523220"/>
+            <a:ext cx="3257551" cy="523220"/>
           </a:xfrm>
           <a:prstGeom prst="rect">
             <a:avLst/>
@@ -8591,7 +8591,7 @@
         <p:spPr>
           <a:xfrm>
             <a:off x="7229475" y="4963207"/>
-            <a:ext cx="3257550" cy="523220"/>
+            <a:ext cx="3257551" cy="523220"/>
           </a:xfrm>
           <a:prstGeom prst="rect">
             <a:avLst/>
@@ -8651,7 +8651,7 @@
         <p:spPr>
           <a:xfrm>
             <a:off x="7229475" y="4962047"/>
-            <a:ext cx="3257550" cy="523220"/>
+            <a:ext cx="3257551" cy="523220"/>
           </a:xfrm>
           <a:prstGeom prst="rect">
             <a:avLst/>
@@ -8711,7 +8711,7 @@
         <p:spPr>
           <a:xfrm>
             <a:off x="7229475" y="4962047"/>
-            <a:ext cx="3257550" cy="523220"/>
+            <a:ext cx="3257551" cy="523220"/>
           </a:xfrm>
           <a:prstGeom prst="rect">
             <a:avLst/>
@@ -8771,7 +8771,7 @@
         <p:spPr>
           <a:xfrm>
             <a:off x="7229475" y="4962047"/>
-            <a:ext cx="3257550" cy="523220"/>
+            <a:ext cx="3257551" cy="523220"/>
           </a:xfrm>
           <a:prstGeom prst="rect">
             <a:avLst/>
@@ -8831,7 +8831,7 @@
         <p:spPr>
           <a:xfrm>
             <a:off x="7229475" y="4960887"/>
-            <a:ext cx="3257550" cy="523220"/>
+            <a:ext cx="3257551" cy="523220"/>
           </a:xfrm>
           <a:prstGeom prst="rect">
             <a:avLst/>
@@ -8891,7 +8891,7 @@
         <p:spPr>
           <a:xfrm>
             <a:off x="7229475" y="4959727"/>
-            <a:ext cx="3257550" cy="523220"/>
+            <a:ext cx="3257551" cy="523220"/>
           </a:xfrm>
           <a:prstGeom prst="rect">
             <a:avLst/>
@@ -11823,8 +11823,8 @@
         </p:nvSpPr>
         <p:spPr>
           <a:xfrm>
-            <a:off x="5839000" y="2034597"/>
-            <a:ext cx="2688772" cy="2525814"/>
+            <a:off x="5839001" y="2034598"/>
+            <a:ext cx="2688772" cy="2525815"/>
           </a:xfrm>
           <a:prstGeom prst="rect">
             <a:avLst/>
@@ -11890,7 +11890,7 @@
         </p:nvGrpSpPr>
         <p:grpSpPr>
           <a:xfrm>
-            <a:off x="1868779" y="517300"/>
+            <a:off x="1868780" y="517298"/>
             <a:ext cx="1561011" cy="261610"/>
             <a:chOff x="609600" y="1421728"/>
             <a:chExt cx="1561011" cy="261610"/>
@@ -12159,8 +12159,8 @@
           </p:nvSpPr>
           <p:spPr>
             <a:xfrm>
-              <a:off x="1368334" y="1421728"/>
-              <a:ext cx="802277" cy="261610"/>
+              <a:off x="1368333" y="1421728"/>
+              <a:ext cx="802278" cy="261610"/>
             </a:xfrm>
             <a:prstGeom prst="rect">
               <a:avLst/>
@@ -12196,8 +12196,8 @@
         </p:nvGrpSpPr>
         <p:grpSpPr>
           <a:xfrm>
-            <a:off x="3805100" y="2776963"/>
-            <a:ext cx="1353640" cy="520541"/>
+            <a:off x="3805100" y="2776966"/>
+            <a:ext cx="1353640" cy="520542"/>
             <a:chOff x="3138350" y="2225040"/>
             <a:chExt cx="1353640" cy="520541"/>
           </a:xfrm>
@@ -12470,7 +12470,7 @@
         </p:nvGrpSpPr>
         <p:grpSpPr>
           <a:xfrm>
-            <a:off x="1868779" y="690500"/>
+            <a:off x="1868780" y="690498"/>
             <a:ext cx="1561011" cy="261610"/>
             <a:chOff x="609600" y="1421728"/>
             <a:chExt cx="1561011" cy="261610"/>
@@ -12739,8 +12739,8 @@
           </p:nvSpPr>
           <p:spPr>
             <a:xfrm>
-              <a:off x="1368334" y="1421728"/>
-              <a:ext cx="802277" cy="261610"/>
+              <a:off x="1368333" y="1421728"/>
+              <a:ext cx="802278" cy="261610"/>
             </a:xfrm>
             <a:prstGeom prst="rect">
               <a:avLst/>
@@ -12776,7 +12776,7 @@
         </p:nvGrpSpPr>
         <p:grpSpPr>
           <a:xfrm>
-            <a:off x="1868779" y="875557"/>
+            <a:off x="1868780" y="875556"/>
             <a:ext cx="1561011" cy="261610"/>
             <a:chOff x="609600" y="1421728"/>
             <a:chExt cx="1561011" cy="261610"/>
@@ -13045,8 +13045,8 @@
           </p:nvSpPr>
           <p:spPr>
             <a:xfrm>
-              <a:off x="1368334" y="1421728"/>
-              <a:ext cx="802277" cy="261610"/>
+              <a:off x="1368333" y="1421728"/>
+              <a:ext cx="802278" cy="261610"/>
             </a:xfrm>
             <a:prstGeom prst="rect">
               <a:avLst/>
@@ -13082,7 +13082,7 @@
         </p:nvGrpSpPr>
         <p:grpSpPr>
           <a:xfrm>
-            <a:off x="1868779" y="1057837"/>
+            <a:off x="1868780" y="1057836"/>
             <a:ext cx="1561011" cy="261610"/>
             <a:chOff x="609600" y="1421728"/>
             <a:chExt cx="1561011" cy="261610"/>
@@ -13351,8 +13351,8 @@
           </p:nvSpPr>
           <p:spPr>
             <a:xfrm>
-              <a:off x="1368334" y="1421728"/>
-              <a:ext cx="802277" cy="261610"/>
+              <a:off x="1368333" y="1421728"/>
+              <a:ext cx="802278" cy="261610"/>
             </a:xfrm>
             <a:prstGeom prst="rect">
               <a:avLst/>
@@ -13388,7 +13388,7 @@
         </p:nvGrpSpPr>
         <p:grpSpPr>
           <a:xfrm>
-            <a:off x="1868779" y="1240348"/>
+            <a:off x="1868780" y="1240347"/>
             <a:ext cx="1561011" cy="261610"/>
             <a:chOff x="609600" y="1421728"/>
             <a:chExt cx="1561011" cy="261610"/>
@@ -13657,8 +13657,8 @@
           </p:nvSpPr>
           <p:spPr>
             <a:xfrm>
-              <a:off x="1368334" y="1421728"/>
-              <a:ext cx="802277" cy="261610"/>
+              <a:off x="1368333" y="1421728"/>
+              <a:ext cx="802278" cy="261610"/>
             </a:xfrm>
             <a:prstGeom prst="rect">
               <a:avLst/>
@@ -13694,7 +13694,7 @@
         </p:nvGrpSpPr>
         <p:grpSpPr>
           <a:xfrm>
-            <a:off x="1868779" y="1422628"/>
+            <a:off x="1868780" y="1422627"/>
             <a:ext cx="1561011" cy="261610"/>
             <a:chOff x="609600" y="1421728"/>
             <a:chExt cx="1561011" cy="261610"/>
@@ -13963,8 +13963,8 @@
           </p:nvSpPr>
           <p:spPr>
             <a:xfrm>
-              <a:off x="1368334" y="1421728"/>
-              <a:ext cx="802277" cy="261610"/>
+              <a:off x="1368333" y="1421728"/>
+              <a:ext cx="802278" cy="261610"/>
             </a:xfrm>
             <a:prstGeom prst="rect">
               <a:avLst/>
@@ -14000,7 +14000,7 @@
         </p:nvGrpSpPr>
         <p:grpSpPr>
           <a:xfrm>
-            <a:off x="1868779" y="1603286"/>
+            <a:off x="1868780" y="1603286"/>
             <a:ext cx="1561011" cy="261610"/>
             <a:chOff x="609600" y="1421728"/>
             <a:chExt cx="1561011" cy="261610"/>
@@ -14269,8 +14269,8 @@
           </p:nvSpPr>
           <p:spPr>
             <a:xfrm>
-              <a:off x="1368334" y="1421728"/>
-              <a:ext cx="802277" cy="261610"/>
+              <a:off x="1368333" y="1421728"/>
+              <a:ext cx="802278" cy="261610"/>
             </a:xfrm>
             <a:prstGeom prst="rect">
               <a:avLst/>
@@ -14306,7 +14306,7 @@
         </p:nvGrpSpPr>
         <p:grpSpPr>
           <a:xfrm>
-            <a:off x="1868779" y="1787353"/>
+            <a:off x="1868780" y="1787352"/>
             <a:ext cx="1561011" cy="261610"/>
             <a:chOff x="609600" y="1421728"/>
             <a:chExt cx="1561011" cy="261610"/>
@@ -14575,8 +14575,8 @@
           </p:nvSpPr>
           <p:spPr>
             <a:xfrm>
-              <a:off x="1368334" y="1421728"/>
-              <a:ext cx="802277" cy="261610"/>
+              <a:off x="1368333" y="1421728"/>
+              <a:ext cx="802278" cy="261610"/>
             </a:xfrm>
             <a:prstGeom prst="rect">
               <a:avLst/>
@@ -14612,7 +14612,7 @@
         </p:nvSpPr>
         <p:spPr>
           <a:xfrm>
-            <a:off x="4358640" y="4006850"/>
+            <a:off x="4358641" y="4006851"/>
             <a:ext cx="175260" cy="165100"/>
           </a:xfrm>
           <a:prstGeom prst="rect">
@@ -14654,11 +14654,11 @@
   <p:clrMapOvr>
     <a:masterClrMapping/>
   </p:clrMapOvr>
-  <mc:AlternateContent xmlns:mc="http://schemas.openxmlformats.org/markup-compatibility/2006">
-    <mc:Choice xmlns:p14="http://schemas.microsoft.com/office/powerpoint/2010/main" Requires="p14">
+  <mc:AlternateContent xmlns:mc="http://schemas.openxmlformats.org/markup-compatibility/2006" xmlns:p14="http://schemas.microsoft.com/office/powerpoint/2010/main">
+    <mc:Choice Requires="p14">
       <p:transition spd="slow" p14:dur="2000" advTm="47315"/>
     </mc:Choice>
-    <mc:Fallback>
+    <mc:Fallback xmlns="">
       <p:transition spd="slow" advTm="47315"/>
     </mc:Fallback>
   </mc:AlternateContent>

</xml_diff>